<commit_message>
Adding some reference docs
</commit_message>
<xml_diff>
--- a/AI_ML-GenAI-an-Overview-Q12024.pptx
+++ b/AI_ML-GenAI-an-Overview-Q12024.pptx
@@ -5,10 +5,10 @@
     <p:sldMasterId id="2147483660" r:id="rId1"/>
   </p:sldMasterIdLst>
   <p:notesMasterIdLst>
-    <p:notesMasterId r:id="rId9"/>
+    <p:notesMasterId r:id="rId14"/>
   </p:notesMasterIdLst>
   <p:handoutMasterIdLst>
-    <p:handoutMasterId r:id="rId10"/>
+    <p:handoutMasterId r:id="rId15"/>
   </p:handoutMasterIdLst>
   <p:sldIdLst>
     <p:sldId id="257" r:id="rId2"/>
@@ -17,7 +17,12 @@
     <p:sldId id="260" r:id="rId5"/>
     <p:sldId id="261" r:id="rId6"/>
     <p:sldId id="262" r:id="rId7"/>
-    <p:sldId id="263" r:id="rId8"/>
+    <p:sldId id="264" r:id="rId8"/>
+    <p:sldId id="263" r:id="rId9"/>
+    <p:sldId id="268" r:id="rId10"/>
+    <p:sldId id="267" r:id="rId11"/>
+    <p:sldId id="266" r:id="rId12"/>
+    <p:sldId id="265" r:id="rId13"/>
   </p:sldIdLst>
   <p:sldSz cx="12188825" cy="6858000"/>
   <p:notesSz cx="6858000" cy="9144000"/>
@@ -4162,6 +4167,318 @@
 </p:sld>
 </file>
 
+<file path=ppt/slides/slide10.xml><?xml version="1.0" encoding="utf-8"?>
+<p:sld xmlns:a="http://schemas.openxmlformats.org/drawingml/2006/main" xmlns:r="http://schemas.openxmlformats.org/officeDocument/2006/relationships" xmlns:p="http://schemas.openxmlformats.org/presentationml/2006/main">
+  <p:cSld>
+    <p:spTree>
+      <p:nvGrpSpPr>
+        <p:cNvPr id="1" name=""/>
+        <p:cNvGrpSpPr/>
+        <p:nvPr/>
+      </p:nvGrpSpPr>
+      <p:grpSpPr>
+        <a:xfrm>
+          <a:off x="0" y="0"/>
+          <a:ext cx="0" cy="0"/>
+          <a:chOff x="0" y="0"/>
+          <a:chExt cx="0" cy="0"/>
+        </a:xfrm>
+      </p:grpSpPr>
+      <p:sp>
+        <p:nvSpPr>
+          <p:cNvPr id="2" name="Title 1"/>
+          <p:cNvSpPr>
+            <a:spLocks noGrp="1"/>
+          </p:cNvSpPr>
+          <p:nvPr>
+            <p:ph type="title"/>
+          </p:nvPr>
+        </p:nvSpPr>
+        <p:spPr/>
+        <p:txBody>
+          <a:bodyPr/>
+          <a:lstStyle/>
+          <a:p>
+            <a:r>
+              <a:rPr lang="en-US" dirty="0"/>
+              <a:t>Recommendation</a:t>
+            </a:r>
+          </a:p>
+        </p:txBody>
+      </p:sp>
+      <p:sp>
+        <p:nvSpPr>
+          <p:cNvPr id="3" name="Content Placeholder 2"/>
+          <p:cNvSpPr>
+            <a:spLocks noGrp="1"/>
+          </p:cNvSpPr>
+          <p:nvPr>
+            <p:ph idx="1"/>
+          </p:nvPr>
+        </p:nvSpPr>
+        <p:spPr/>
+        <p:txBody>
+          <a:bodyPr/>
+          <a:lstStyle/>
+          <a:p>
+            <a:r>
+              <a:rPr lang="en-US" dirty="0"/>
+              <a:t>Recommend one or more of the strategies.</a:t>
+            </a:r>
+          </a:p>
+          <a:p>
+            <a:r>
+              <a:rPr lang="en-US" dirty="0"/>
+              <a:t>Summarize the results if things go as proposed.</a:t>
+            </a:r>
+          </a:p>
+          <a:p>
+            <a:r>
+              <a:rPr lang="en-US" dirty="0"/>
+              <a:t>What to do next.</a:t>
+            </a:r>
+          </a:p>
+          <a:p>
+            <a:r>
+              <a:rPr lang="en-US" dirty="0"/>
+              <a:t>Identify action items.</a:t>
+            </a:r>
+          </a:p>
+        </p:txBody>
+      </p:sp>
+    </p:spTree>
+    <p:extLst>
+      <p:ext uri="{BB962C8B-B14F-4D97-AF65-F5344CB8AC3E}">
+        <p14:creationId xmlns:p14="http://schemas.microsoft.com/office/powerpoint/2010/main" val="2439270718"/>
+      </p:ext>
+    </p:extLst>
+  </p:cSld>
+  <p:clrMapOvr>
+    <a:masterClrMapping/>
+  </p:clrMapOvr>
+  <mc:AlternateContent xmlns:mc="http://schemas.openxmlformats.org/markup-compatibility/2006">
+    <mc:Choice xmlns:p14="http://schemas.microsoft.com/office/powerpoint/2010/main" Requires="p14">
+      <p:transition spd="med" p14:dur="700">
+        <p:fade/>
+      </p:transition>
+    </mc:Choice>
+    <mc:Fallback>
+      <p:transition spd="med">
+        <p:fade/>
+      </p:transition>
+    </mc:Fallback>
+  </mc:AlternateContent>
+</p:sld>
+</file>
+
+<file path=ppt/slides/slide11.xml><?xml version="1.0" encoding="utf-8"?>
+<p:sld xmlns:a="http://schemas.openxmlformats.org/drawingml/2006/main" xmlns:r="http://schemas.openxmlformats.org/officeDocument/2006/relationships" xmlns:p="http://schemas.openxmlformats.org/presentationml/2006/main">
+  <p:cSld>
+    <p:spTree>
+      <p:nvGrpSpPr>
+        <p:cNvPr id="1" name=""/>
+        <p:cNvGrpSpPr/>
+        <p:nvPr/>
+      </p:nvGrpSpPr>
+      <p:grpSpPr>
+        <a:xfrm>
+          <a:off x="0" y="0"/>
+          <a:ext cx="0" cy="0"/>
+          <a:chOff x="0" y="0"/>
+          <a:chExt cx="0" cy="0"/>
+        </a:xfrm>
+      </p:grpSpPr>
+      <p:sp>
+        <p:nvSpPr>
+          <p:cNvPr id="2" name="Title 1"/>
+          <p:cNvSpPr>
+            <a:spLocks noGrp="1"/>
+          </p:cNvSpPr>
+          <p:nvPr>
+            <p:ph type="title"/>
+          </p:nvPr>
+        </p:nvSpPr>
+        <p:spPr/>
+        <p:txBody>
+          <a:bodyPr/>
+          <a:lstStyle/>
+          <a:p>
+            <a:r>
+              <a:rPr lang="en-US" dirty="0"/>
+              <a:t>Recommendation</a:t>
+            </a:r>
+          </a:p>
+        </p:txBody>
+      </p:sp>
+      <p:sp>
+        <p:nvSpPr>
+          <p:cNvPr id="3" name="Content Placeholder 2"/>
+          <p:cNvSpPr>
+            <a:spLocks noGrp="1"/>
+          </p:cNvSpPr>
+          <p:nvPr>
+            <p:ph idx="1"/>
+          </p:nvPr>
+        </p:nvSpPr>
+        <p:spPr/>
+        <p:txBody>
+          <a:bodyPr/>
+          <a:lstStyle/>
+          <a:p>
+            <a:r>
+              <a:rPr lang="en-US" dirty="0"/>
+              <a:t>Recommend one or more of the strategies.</a:t>
+            </a:r>
+          </a:p>
+          <a:p>
+            <a:r>
+              <a:rPr lang="en-US" dirty="0"/>
+              <a:t>Summarize the results if things go as proposed.</a:t>
+            </a:r>
+          </a:p>
+          <a:p>
+            <a:r>
+              <a:rPr lang="en-US" dirty="0"/>
+              <a:t>What to do next.</a:t>
+            </a:r>
+          </a:p>
+          <a:p>
+            <a:r>
+              <a:rPr lang="en-US" dirty="0"/>
+              <a:t>Identify action items.</a:t>
+            </a:r>
+          </a:p>
+        </p:txBody>
+      </p:sp>
+    </p:spTree>
+    <p:extLst>
+      <p:ext uri="{BB962C8B-B14F-4D97-AF65-F5344CB8AC3E}">
+        <p14:creationId xmlns:p14="http://schemas.microsoft.com/office/powerpoint/2010/main" val="2407826523"/>
+      </p:ext>
+    </p:extLst>
+  </p:cSld>
+  <p:clrMapOvr>
+    <a:masterClrMapping/>
+  </p:clrMapOvr>
+  <mc:AlternateContent xmlns:mc="http://schemas.openxmlformats.org/markup-compatibility/2006">
+    <mc:Choice xmlns:p14="http://schemas.microsoft.com/office/powerpoint/2010/main" Requires="p14">
+      <p:transition spd="med" p14:dur="700">
+        <p:fade/>
+      </p:transition>
+    </mc:Choice>
+    <mc:Fallback>
+      <p:transition spd="med">
+        <p:fade/>
+      </p:transition>
+    </mc:Fallback>
+  </mc:AlternateContent>
+</p:sld>
+</file>
+
+<file path=ppt/slides/slide12.xml><?xml version="1.0" encoding="utf-8"?>
+<p:sld xmlns:a="http://schemas.openxmlformats.org/drawingml/2006/main" xmlns:r="http://schemas.openxmlformats.org/officeDocument/2006/relationships" xmlns:p="http://schemas.openxmlformats.org/presentationml/2006/main">
+  <p:cSld>
+    <p:spTree>
+      <p:nvGrpSpPr>
+        <p:cNvPr id="1" name=""/>
+        <p:cNvGrpSpPr/>
+        <p:nvPr/>
+      </p:nvGrpSpPr>
+      <p:grpSpPr>
+        <a:xfrm>
+          <a:off x="0" y="0"/>
+          <a:ext cx="0" cy="0"/>
+          <a:chOff x="0" y="0"/>
+          <a:chExt cx="0" cy="0"/>
+        </a:xfrm>
+      </p:grpSpPr>
+      <p:sp>
+        <p:nvSpPr>
+          <p:cNvPr id="2" name="Title 1"/>
+          <p:cNvSpPr>
+            <a:spLocks noGrp="1"/>
+          </p:cNvSpPr>
+          <p:nvPr>
+            <p:ph type="title"/>
+          </p:nvPr>
+        </p:nvSpPr>
+        <p:spPr/>
+        <p:txBody>
+          <a:bodyPr/>
+          <a:lstStyle/>
+          <a:p>
+            <a:r>
+              <a:rPr lang="en-US" dirty="0"/>
+              <a:t>Recommendation</a:t>
+            </a:r>
+          </a:p>
+        </p:txBody>
+      </p:sp>
+      <p:sp>
+        <p:nvSpPr>
+          <p:cNvPr id="3" name="Content Placeholder 2"/>
+          <p:cNvSpPr>
+            <a:spLocks noGrp="1"/>
+          </p:cNvSpPr>
+          <p:nvPr>
+            <p:ph idx="1"/>
+          </p:nvPr>
+        </p:nvSpPr>
+        <p:spPr/>
+        <p:txBody>
+          <a:bodyPr/>
+          <a:lstStyle/>
+          <a:p>
+            <a:r>
+              <a:rPr lang="en-US" dirty="0"/>
+              <a:t>Recommend one or more of the strategies.</a:t>
+            </a:r>
+          </a:p>
+          <a:p>
+            <a:r>
+              <a:rPr lang="en-US" dirty="0"/>
+              <a:t>Summarize the results if things go as proposed.</a:t>
+            </a:r>
+          </a:p>
+          <a:p>
+            <a:r>
+              <a:rPr lang="en-US" dirty="0"/>
+              <a:t>What to do next.</a:t>
+            </a:r>
+          </a:p>
+          <a:p>
+            <a:r>
+              <a:rPr lang="en-US" dirty="0"/>
+              <a:t>Identify action items.</a:t>
+            </a:r>
+          </a:p>
+        </p:txBody>
+      </p:sp>
+    </p:spTree>
+    <p:extLst>
+      <p:ext uri="{BB962C8B-B14F-4D97-AF65-F5344CB8AC3E}">
+        <p14:creationId xmlns:p14="http://schemas.microsoft.com/office/powerpoint/2010/main" val="2198329496"/>
+      </p:ext>
+    </p:extLst>
+  </p:cSld>
+  <p:clrMapOvr>
+    <a:masterClrMapping/>
+  </p:clrMapOvr>
+  <mc:AlternateContent xmlns:mc="http://schemas.openxmlformats.org/markup-compatibility/2006">
+    <mc:Choice xmlns:p14="http://schemas.microsoft.com/office/powerpoint/2010/main" Requires="p14">
+      <p:transition spd="med" p14:dur="700">
+        <p:fade/>
+      </p:transition>
+    </mc:Choice>
+    <mc:Fallback>
+      <p:transition spd="med">
+        <p:fade/>
+      </p:transition>
+    </mc:Fallback>
+  </mc:AlternateContent>
+</p:sld>
+</file>
+
 <file path=ppt/slides/slide2.xml><?xml version="1.0" encoding="utf-8"?>
 <p:sld xmlns:a="http://schemas.openxmlformats.org/drawingml/2006/main" xmlns:r="http://schemas.openxmlformats.org/officeDocument/2006/relationships" xmlns:p="http://schemas.openxmlformats.org/presentationml/2006/main">
   <p:cSld>
@@ -4196,7 +4513,7 @@
           <a:p>
             <a:r>
               <a:rPr lang="en-US" dirty="0"/>
-              <a:t>Structure</a:t>
+              <a:t>General outline</a:t>
             </a:r>
           </a:p>
         </p:txBody>
@@ -4364,28 +4681,161 @@
             </a:r>
           </a:p>
           <a:p>
-            <a:r>
-              <a:rPr lang="en-US" dirty="0"/>
-              <a:t>State the desired objective.</a:t>
-            </a:r>
-          </a:p>
-          <a:p>
-            <a:r>
-              <a:rPr lang="en-US" dirty="0"/>
-              <a:t>Use multiple points if necessary.</a:t>
-            </a:r>
-          </a:p>
-          <a:p>
+            <a:pPr marL="45720" indent="0">
+              <a:buNone/>
+            </a:pPr>
+            <a:endParaRPr lang="en-US" sz="1600" dirty="0"/>
+          </a:p>
+          <a:p>
+            <a:r>
+              <a:rPr lang="en-US" dirty="0"/>
+              <a:t>How old is the concept of AI/ML? </a:t>
+            </a:r>
+          </a:p>
+          <a:p>
+            <a:pPr marL="45720" indent="0">
+              <a:buNone/>
+            </a:pPr>
+            <a:r>
+              <a:rPr lang="en-US" dirty="0"/>
+              <a:t>	</a:t>
+            </a:r>
+            <a:r>
+              <a:rPr lang="en-US" sz="1600" dirty="0"/>
+              <a:t>10 to 15 years? 30 years? .. </a:t>
+            </a:r>
             <a:endParaRPr lang="en-US" dirty="0"/>
           </a:p>
-        </p:txBody>
-      </p:sp>
+          <a:p>
+            <a:pPr marL="45720" indent="0">
+              <a:buNone/>
+            </a:pPr>
+            <a:endParaRPr lang="en-US" dirty="0"/>
+          </a:p>
+          <a:p>
+            <a:endParaRPr lang="en-US" dirty="0"/>
+          </a:p>
+        </p:txBody>
+      </p:sp>
+      <p:grpSp>
+        <p:nvGrpSpPr>
+          <p:cNvPr id="6" name="Group 5">
+            <a:extLst>
+              <a:ext uri="{FF2B5EF4-FFF2-40B4-BE49-F238E27FC236}">
+                <a16:creationId xmlns:a16="http://schemas.microsoft.com/office/drawing/2014/main" id="{A0907152-1E01-2544-23E6-A35466BD4C2D}"/>
+              </a:ext>
+            </a:extLst>
+          </p:cNvPr>
+          <p:cNvGrpSpPr/>
+          <p:nvPr/>
+        </p:nvGrpSpPr>
+        <p:grpSpPr>
+          <a:xfrm>
+            <a:off x="5637212" y="1676400"/>
+            <a:ext cx="5445618" cy="2792611"/>
+            <a:chOff x="5713412" y="1676400"/>
+            <a:chExt cx="5445618" cy="2792611"/>
+          </a:xfrm>
+        </p:grpSpPr>
+        <p:pic>
+          <p:nvPicPr>
+            <p:cNvPr id="4" name="Picture 3">
+              <a:extLst>
+                <a:ext uri="{FF2B5EF4-FFF2-40B4-BE49-F238E27FC236}">
+                  <a16:creationId xmlns:a16="http://schemas.microsoft.com/office/drawing/2014/main" id="{3B289C9D-C78F-5003-ACA5-B960FB2D9F7B}"/>
+                </a:ext>
+              </a:extLst>
+            </p:cNvPr>
+            <p:cNvPicPr>
+              <a:picLocks noChangeAspect="1"/>
+            </p:cNvPicPr>
+            <p:nvPr/>
+          </p:nvPicPr>
+          <p:blipFill>
+            <a:blip r:embed="rId2">
+              <a:alphaModFix amt="85000"/>
+            </a:blip>
+            <a:stretch>
+              <a:fillRect/>
+            </a:stretch>
+          </p:blipFill>
+          <p:spPr>
+            <a:xfrm>
+              <a:off x="5713412" y="1676400"/>
+              <a:ext cx="5445618" cy="2440901"/>
+            </a:xfrm>
+            <a:prstGeom prst="rect">
+              <a:avLst/>
+            </a:prstGeom>
+            <a:ln>
+              <a:solidFill>
+                <a:srgbClr val="00A4A6"/>
+              </a:solidFill>
+            </a:ln>
+            <a:effectLst>
+              <a:outerShdw blurRad="50800" dist="38100" dir="2700000" algn="tl" rotWithShape="0">
+                <a:prstClr val="black">
+                  <a:alpha val="40000"/>
+                </a:prstClr>
+              </a:outerShdw>
+            </a:effectLst>
+          </p:spPr>
+        </p:pic>
+        <p:sp>
+          <p:nvSpPr>
+            <p:cNvPr id="5" name="TextBox 4">
+              <a:extLst>
+                <a:ext uri="{FF2B5EF4-FFF2-40B4-BE49-F238E27FC236}">
+                  <a16:creationId xmlns:a16="http://schemas.microsoft.com/office/drawing/2014/main" id="{16A38D90-FA68-7E01-9722-AAAD2B91D611}"/>
+                </a:ext>
+              </a:extLst>
+            </p:cNvPr>
+            <p:cNvSpPr txBox="1"/>
+            <p:nvPr/>
+          </p:nvSpPr>
+          <p:spPr>
+            <a:xfrm>
+              <a:off x="5789612" y="4222790"/>
+              <a:ext cx="4114800" cy="246221"/>
+            </a:xfrm>
+            <a:prstGeom prst="rect">
+              <a:avLst/>
+            </a:prstGeom>
+            <a:noFill/>
+            <a:ln>
+              <a:noFill/>
+            </a:ln>
+          </p:spPr>
+          <p:txBody>
+            <a:bodyPr wrap="square" rtlCol="0" anchor="ctr" anchorCtr="1">
+              <a:spAutoFit/>
+            </a:bodyPr>
+            <a:lstStyle/>
+            <a:p>
+              <a:r>
+                <a:rPr lang="en-US" sz="1000" dirty="0"/>
+                <a:t>Source: </a:t>
+              </a:r>
+              <a:r>
+                <a:rPr lang="en-US" sz="1000" dirty="0">
+                  <a:hlinkClick r:id="rId3"/>
+                </a:rPr>
+                <a:t>https://www.merriam-webster.com/dictionary/intelligence</a:t>
+              </a:r>
+              <a:r>
+                <a:rPr lang="en-US" sz="1000" dirty="0"/>
+                <a:t> </a:t>
+              </a:r>
+            </a:p>
+          </p:txBody>
+        </p:sp>
+      </p:grpSp>
       <p:pic>
         <p:nvPicPr>
-          <p:cNvPr id="4" name="Picture 3">
+          <p:cNvPr id="7" name="Picture 6">
             <a:extLst>
               <a:ext uri="{FF2B5EF4-FFF2-40B4-BE49-F238E27FC236}">
-                <a16:creationId xmlns:a16="http://schemas.microsoft.com/office/drawing/2014/main" id="{3B289C9D-C78F-5003-ACA5-B960FB2D9F7B}"/>
+                <a16:creationId xmlns:a16="http://schemas.microsoft.com/office/drawing/2014/main" id="{A276014A-29AC-F56B-EE49-E2FEC0FAF061}"/>
               </a:ext>
             </a:extLst>
           </p:cNvPr>
@@ -4395,8 +4845,8 @@
           <p:nvPr/>
         </p:nvPicPr>
         <p:blipFill>
-          <a:blip r:embed="rId2">
-            <a:alphaModFix amt="85000"/>
+          <a:blip r:embed="rId4">
+            <a:alphaModFix amt="84000"/>
           </a:blip>
           <a:stretch>
             <a:fillRect/>
@@ -4404,8 +4854,8 @@
         </p:blipFill>
         <p:spPr>
           <a:xfrm>
-            <a:off x="5713412" y="1676400"/>
-            <a:ext cx="5445618" cy="2440901"/>
+            <a:off x="2208212" y="4771055"/>
+            <a:ext cx="6057900" cy="1248745"/>
           </a:xfrm>
           <a:prstGeom prst="rect">
             <a:avLst/>
@@ -4424,54 +4874,6 @@
           </a:effectLst>
         </p:spPr>
       </p:pic>
-      <p:sp>
-        <p:nvSpPr>
-          <p:cNvPr id="5" name="TextBox 4">
-            <a:extLst>
-              <a:ext uri="{FF2B5EF4-FFF2-40B4-BE49-F238E27FC236}">
-                <a16:creationId xmlns:a16="http://schemas.microsoft.com/office/drawing/2014/main" id="{16A38D90-FA68-7E01-9722-AAAD2B91D611}"/>
-              </a:ext>
-            </a:extLst>
-          </p:cNvPr>
-          <p:cNvSpPr txBox="1"/>
-          <p:nvPr/>
-        </p:nvSpPr>
-        <p:spPr>
-          <a:xfrm>
-            <a:off x="5789612" y="4222790"/>
-            <a:ext cx="4114800" cy="246221"/>
-          </a:xfrm>
-          <a:prstGeom prst="rect">
-            <a:avLst/>
-          </a:prstGeom>
-          <a:noFill/>
-          <a:ln>
-            <a:noFill/>
-          </a:ln>
-        </p:spPr>
-        <p:txBody>
-          <a:bodyPr wrap="square" rtlCol="0" anchor="ctr" anchorCtr="1">
-            <a:spAutoFit/>
-          </a:bodyPr>
-          <a:lstStyle/>
-          <a:p>
-            <a:r>
-              <a:rPr lang="en-US" sz="1000" dirty="0"/>
-              <a:t>Source: </a:t>
-            </a:r>
-            <a:r>
-              <a:rPr lang="en-US" sz="1000" dirty="0">
-                <a:hlinkClick r:id="rId3"/>
-              </a:rPr>
-              <a:t>https://www.merriam-webster.com/dictionary/intelligence</a:t>
-            </a:r>
-            <a:r>
-              <a:rPr lang="en-US" sz="1000" dirty="0"/>
-              <a:t> </a:t>
-            </a:r>
-          </a:p>
-        </p:txBody>
-      </p:sp>
     </p:spTree>
     <p:extLst>
       <p:ext uri="{BB962C8B-B14F-4D97-AF65-F5344CB8AC3E}">
@@ -4524,14 +4926,23 @@
             <p:ph type="title"/>
           </p:nvPr>
         </p:nvSpPr>
-        <p:spPr/>
+        <p:spPr>
+          <a:xfrm>
+            <a:off x="1065211" y="115202"/>
+            <a:ext cx="8686801" cy="1066800"/>
+          </a:xfrm>
+        </p:spPr>
         <p:txBody>
           <a:bodyPr/>
           <a:lstStyle/>
           <a:p>
             <a:r>
               <a:rPr lang="en-US" dirty="0"/>
-              <a:t>Today’s Situation</a:t>
+              <a:t>Today’s </a:t>
+            </a:r>
+            <a:r>
+              <a:rPr lang="en-US" i="1" dirty="0"/>
+              <a:t>lay of the land</a:t>
             </a:r>
           </a:p>
         </p:txBody>
@@ -4546,24 +4957,101 @@
             <p:ph idx="1"/>
           </p:nvPr>
         </p:nvSpPr>
-        <p:spPr/>
+        <p:spPr>
+          <a:xfrm>
+            <a:off x="1065210" y="1333500"/>
+            <a:ext cx="8686801" cy="4191000"/>
+          </a:xfrm>
+        </p:spPr>
         <p:txBody>
           <a:bodyPr/>
           <a:lstStyle/>
           <a:p>
             <a:r>
               <a:rPr lang="en-US" dirty="0"/>
-              <a:t>Summary of the current situation.</a:t>
-            </a:r>
-          </a:p>
-          <a:p>
-            <a:r>
-              <a:rPr lang="en-US" dirty="0"/>
-              <a:t>Use brief bullets, discuss details verbally.</a:t>
-            </a:r>
-          </a:p>
-        </p:txBody>
-      </p:sp>
+              <a:t>Many ways to structure the dynamic field of AI/ML </a:t>
+            </a:r>
+          </a:p>
+          <a:p>
+            <a:pPr marL="45720" indent="0">
+              <a:buNone/>
+            </a:pPr>
+            <a:endParaRPr lang="en-US" dirty="0"/>
+          </a:p>
+        </p:txBody>
+      </p:sp>
+      <p:pic>
+        <p:nvPicPr>
+          <p:cNvPr id="5" name="Picture 4" descr="A diagram of machine learning&#10;&#10;Description automatically generated">
+            <a:extLst>
+              <a:ext uri="{FF2B5EF4-FFF2-40B4-BE49-F238E27FC236}">
+                <a16:creationId xmlns:a16="http://schemas.microsoft.com/office/drawing/2014/main" id="{9EDC6946-C9F6-BDAE-5E07-C6086D6DECC6}"/>
+              </a:ext>
+            </a:extLst>
+          </p:cNvPr>
+          <p:cNvPicPr>
+            <a:picLocks noChangeAspect="1"/>
+          </p:cNvPicPr>
+          <p:nvPr/>
+        </p:nvPicPr>
+        <p:blipFill>
+          <a:blip r:embed="rId2">
+            <a:extLst>
+              <a:ext uri="{28A0092B-C50C-407E-A947-70E740481C1C}">
+                <a14:useLocalDpi xmlns:a14="http://schemas.microsoft.com/office/drawing/2010/main" val="0"/>
+              </a:ext>
+            </a:extLst>
+          </a:blip>
+          <a:stretch>
+            <a:fillRect/>
+          </a:stretch>
+        </p:blipFill>
+        <p:spPr>
+          <a:xfrm>
+            <a:off x="5027612" y="1333501"/>
+            <a:ext cx="5800604" cy="3238500"/>
+          </a:xfrm>
+          <a:prstGeom prst="rect">
+            <a:avLst/>
+          </a:prstGeom>
+        </p:spPr>
+      </p:pic>
+      <p:pic>
+        <p:nvPicPr>
+          <p:cNvPr id="7" name="Picture 6" descr="A diagram of a machine learning&#10;&#10;Description automatically generated">
+            <a:extLst>
+              <a:ext uri="{FF2B5EF4-FFF2-40B4-BE49-F238E27FC236}">
+                <a16:creationId xmlns:a16="http://schemas.microsoft.com/office/drawing/2014/main" id="{16C9BB24-724E-4191-B441-F0BD8319B19B}"/>
+              </a:ext>
+            </a:extLst>
+          </p:cNvPr>
+          <p:cNvPicPr>
+            <a:picLocks noChangeAspect="1"/>
+          </p:cNvPicPr>
+          <p:nvPr/>
+        </p:nvPicPr>
+        <p:blipFill>
+          <a:blip r:embed="rId3">
+            <a:extLst>
+              <a:ext uri="{28A0092B-C50C-407E-A947-70E740481C1C}">
+                <a14:useLocalDpi xmlns:a14="http://schemas.microsoft.com/office/drawing/2010/main" val="0"/>
+              </a:ext>
+            </a:extLst>
+          </a:blip>
+          <a:stretch>
+            <a:fillRect/>
+          </a:stretch>
+        </p:blipFill>
+        <p:spPr>
+          <a:xfrm>
+            <a:off x="989012" y="2512934"/>
+            <a:ext cx="6350000" cy="3577682"/>
+          </a:xfrm>
+          <a:prstGeom prst="rect">
+            <a:avLst/>
+          </a:prstGeom>
+        </p:spPr>
+      </p:pic>
     </p:spTree>
     <p:extLst>
       <p:ext uri="{BB962C8B-B14F-4D97-AF65-F5344CB8AC3E}">
@@ -4616,14 +5104,19 @@
             <p:ph type="title"/>
           </p:nvPr>
         </p:nvSpPr>
-        <p:spPr/>
+        <p:spPr>
+          <a:xfrm>
+            <a:off x="1036730" y="152400"/>
+            <a:ext cx="8686801" cy="1066800"/>
+          </a:xfrm>
+        </p:spPr>
         <p:txBody>
           <a:bodyPr/>
           <a:lstStyle/>
           <a:p>
             <a:r>
               <a:rPr lang="en-US" dirty="0"/>
-              <a:t>How Did We Get Here?</a:t>
+              <a:t>Key terminology </a:t>
             </a:r>
           </a:p>
         </p:txBody>
@@ -4638,20 +5131,219 @@
             <p:ph idx="1"/>
           </p:nvPr>
         </p:nvSpPr>
-        <p:spPr/>
+        <p:spPr>
+          <a:xfrm>
+            <a:off x="1026177" y="1172400"/>
+            <a:ext cx="8686801" cy="4191000"/>
+          </a:xfrm>
+        </p:spPr>
         <p:txBody>
           <a:bodyPr/>
           <a:lstStyle/>
           <a:p>
-            <a:r>
-              <a:rPr lang="en-US" dirty="0"/>
-              <a:t>Any relevant historical information.</a:t>
-            </a:r>
-          </a:p>
-          <a:p>
-            <a:r>
-              <a:rPr lang="en-US" dirty="0"/>
-              <a:t>Original assumptions that are no longer valid.</a:t>
+            <a:pPr marL="45720" indent="0">
+              <a:buNone/>
+            </a:pPr>
+            <a:r>
+              <a:rPr lang="en-US" u="sng" dirty="0"/>
+              <a:t>Vocabulary</a:t>
+            </a:r>
+            <a:r>
+              <a:rPr lang="en-US" dirty="0"/>
+              <a:t>  </a:t>
+            </a:r>
+          </a:p>
+          <a:p>
+            <a:pPr marL="45720" indent="0">
+              <a:buNone/>
+            </a:pPr>
+            <a:r>
+              <a:rPr lang="en-US" dirty="0"/>
+              <a:t>	Attention, Reasoning, Comprehension, Perception, Learning, -- Cognitive computing</a:t>
+            </a:r>
+          </a:p>
+          <a:p>
+            <a:pPr marL="45720" indent="0">
+              <a:buNone/>
+            </a:pPr>
+            <a:r>
+              <a:rPr lang="en-US" dirty="0"/>
+              <a:t>    </a:t>
+            </a:r>
+            <a:r>
+              <a:rPr lang="en-US" u="sng" dirty="0"/>
+              <a:t>Cognition</a:t>
+            </a:r>
+            <a:r>
+              <a:rPr lang="en-US" dirty="0"/>
+              <a:t> - The mental action or process of </a:t>
+            </a:r>
+            <a:r>
+              <a:rPr lang="en-US" i="1" dirty="0"/>
+              <a:t>acquiring knowledge and understanding through thought, experience, and the senses</a:t>
+            </a:r>
+            <a:r>
+              <a:rPr lang="en-US" dirty="0"/>
+              <a:t>. [Oxford Dictionary]</a:t>
+            </a:r>
+          </a:p>
+          <a:p>
+            <a:pPr marL="45720" indent="0">
+              <a:buNone/>
+            </a:pPr>
+            <a:r>
+              <a:rPr lang="en-US" u="sng" dirty="0"/>
+              <a:t>Machine learning</a:t>
+            </a:r>
+            <a:r>
+              <a:rPr lang="en-US" dirty="0"/>
+              <a:t>: </a:t>
+            </a:r>
+          </a:p>
+          <a:p>
+            <a:pPr marL="45720" indent="0">
+              <a:buNone/>
+            </a:pPr>
+            <a:r>
+              <a:rPr lang="en-US" dirty="0"/>
+              <a:t>	Parametric learning vs. Non-parametric learning</a:t>
+            </a:r>
+          </a:p>
+          <a:p>
+            <a:pPr marL="45720" indent="0">
+              <a:buNone/>
+            </a:pPr>
+            <a:endParaRPr lang="en-US" dirty="0"/>
+          </a:p>
+        </p:txBody>
+      </p:sp>
+      <p:sp>
+        <p:nvSpPr>
+          <p:cNvPr id="4" name="TextBox 3">
+            <a:extLst>
+              <a:ext uri="{FF2B5EF4-FFF2-40B4-BE49-F238E27FC236}">
+                <a16:creationId xmlns:a16="http://schemas.microsoft.com/office/drawing/2014/main" id="{C0C06D2E-277F-F0A3-002F-A3926BA2262D}"/>
+              </a:ext>
+            </a:extLst>
+          </p:cNvPr>
+          <p:cNvSpPr txBox="1"/>
+          <p:nvPr/>
+        </p:nvSpPr>
+        <p:spPr>
+          <a:xfrm>
+            <a:off x="1522412" y="4511933"/>
+            <a:ext cx="8001000" cy="1631216"/>
+          </a:xfrm>
+          <a:prstGeom prst="rect">
+            <a:avLst/>
+          </a:prstGeom>
+          <a:gradFill flip="none" rotWithShape="1">
+            <a:gsLst>
+              <a:gs pos="0">
+                <a:schemeClr val="accent4">
+                  <a:lumMod val="5000"/>
+                  <a:lumOff val="95000"/>
+                </a:schemeClr>
+              </a:gs>
+              <a:gs pos="83000">
+                <a:schemeClr val="accent4">
+                  <a:lumMod val="45000"/>
+                  <a:lumOff val="55000"/>
+                </a:schemeClr>
+              </a:gs>
+              <a:gs pos="91000">
+                <a:schemeClr val="accent4">
+                  <a:lumMod val="45000"/>
+                  <a:lumOff val="55000"/>
+                </a:schemeClr>
+              </a:gs>
+              <a:gs pos="100000">
+                <a:schemeClr val="accent4">
+                  <a:lumMod val="30000"/>
+                  <a:lumOff val="70000"/>
+                </a:schemeClr>
+              </a:gs>
+            </a:gsLst>
+            <a:lin ang="0" scaled="0"/>
+            <a:tileRect/>
+          </a:gradFill>
+          <a:ln w="19050">
+            <a:solidFill>
+              <a:schemeClr val="tx1"/>
+            </a:solidFill>
+          </a:ln>
+          <a:effectLst>
+            <a:outerShdw blurRad="50800" dist="38100" dir="2700000" algn="tl" rotWithShape="0">
+              <a:prstClr val="black">
+                <a:alpha val="40000"/>
+              </a:prstClr>
+            </a:outerShdw>
+            <a:softEdge rad="0"/>
+          </a:effectLst>
+        </p:spPr>
+        <p:txBody>
+          <a:bodyPr wrap="square" rtlCol="0" anchor="ctr" anchorCtr="1">
+            <a:noAutofit/>
+          </a:bodyPr>
+          <a:lstStyle/>
+          <a:p>
+            <a:pPr>
+              <a:spcAft>
+                <a:spcPts val="1200"/>
+              </a:spcAft>
+            </a:pPr>
+            <a:r>
+              <a:rPr lang="en-US" sz="1400" u="sng" dirty="0"/>
+              <a:t>Gradient descent</a:t>
+            </a:r>
+            <a:r>
+              <a:rPr lang="en-US" sz="1400" dirty="0"/>
+              <a:t>: iterative optimization algorithm used to minimize the loss function</a:t>
+            </a:r>
+          </a:p>
+          <a:p>
+            <a:pPr>
+              <a:spcAft>
+                <a:spcPts val="1200"/>
+              </a:spcAft>
+            </a:pPr>
+            <a:r>
+              <a:rPr lang="en-US" sz="1400" u="sng" dirty="0"/>
+              <a:t>Loss function</a:t>
+            </a:r>
+            <a:r>
+              <a:rPr lang="en-US" sz="1400" dirty="0"/>
+              <a:t>: quantifies the difference between predictions and ground truth</a:t>
+            </a:r>
+          </a:p>
+          <a:p>
+            <a:pPr>
+              <a:spcAft>
+                <a:spcPts val="1200"/>
+              </a:spcAft>
+            </a:pPr>
+            <a:r>
+              <a:rPr lang="en-US" sz="1400" u="sng" dirty="0"/>
+              <a:t>Backpropagation</a:t>
+            </a:r>
+            <a:r>
+              <a:rPr lang="en-US" sz="1400" dirty="0"/>
+              <a:t>: algorithm for computing gradients of the loss function with respect to network parameters</a:t>
+            </a:r>
+          </a:p>
+          <a:p>
+            <a:pPr>
+              <a:spcAft>
+                <a:spcPts val="1200"/>
+              </a:spcAft>
+            </a:pPr>
+            <a:r>
+              <a:rPr lang="en-US" sz="1400" u="sng" dirty="0"/>
+              <a:t>Learning rate</a:t>
+            </a:r>
+            <a:r>
+              <a:rPr lang="en-US" sz="1400" dirty="0"/>
+              <a:t>: hyperparameter controlling the step size of gradient descent updates</a:t>
             </a:r>
           </a:p>
         </p:txBody>
@@ -4715,7 +5407,11 @@
           <a:p>
             <a:r>
               <a:rPr lang="en-US" dirty="0"/>
-              <a:t>Available Options</a:t>
+              <a:t>ML: </a:t>
+            </a:r>
+            <a:r>
+              <a:rPr lang="en-US" sz="2400" dirty="0"/>
+              <a:t> Parametric learning</a:t>
             </a:r>
           </a:p>
         </p:txBody>
@@ -4730,26 +5426,101 @@
             <p:ph idx="1"/>
           </p:nvPr>
         </p:nvSpPr>
-        <p:spPr/>
-        <p:txBody>
-          <a:bodyPr/>
+        <p:spPr>
+          <a:xfrm>
+            <a:off x="1065212" y="1828800"/>
+            <a:ext cx="9144000" cy="4191000"/>
+          </a:xfrm>
+        </p:spPr>
+        <p:txBody>
+          <a:bodyPr>
+            <a:normAutofit fontScale="85000" lnSpcReduction="10000"/>
+          </a:bodyPr>
           <a:lstStyle/>
           <a:p>
-            <a:r>
-              <a:rPr lang="en-US" dirty="0"/>
-              <a:t>State the alternative strategies.</a:t>
-            </a:r>
-          </a:p>
-          <a:p>
-            <a:r>
-              <a:rPr lang="en-US" dirty="0"/>
-              <a:t>List advantages &amp; disadvantages of each.</a:t>
-            </a:r>
-          </a:p>
-          <a:p>
-            <a:r>
-              <a:rPr lang="en-US" dirty="0"/>
-              <a:t>State cost of each option.</a:t>
+            <a:pPr marL="45720" indent="0">
+              <a:buNone/>
+            </a:pPr>
+            <a:r>
+              <a:rPr lang="en-US" dirty="0"/>
+              <a:t>Consider the equation for a straight line (Ax + By + C = 0).</a:t>
+            </a:r>
+          </a:p>
+          <a:p>
+            <a:pPr marL="45720" indent="0">
+              <a:buNone/>
+            </a:pPr>
+            <a:r>
+              <a:rPr lang="en-US" dirty="0"/>
+              <a:t>There are two parameters that define the boundary for a given scenario (Yes/No). </a:t>
+            </a:r>
+          </a:p>
+          <a:p>
+            <a:pPr marL="45720" indent="0">
+              <a:buNone/>
+            </a:pPr>
+            <a:r>
+              <a:rPr lang="en-US" dirty="0"/>
+              <a:t>When we use a Llama 2 trained on 7B, 13B, or 70B… it gives us the idea why it is expensive to train and build a good model. </a:t>
+            </a:r>
+          </a:p>
+          <a:p>
+            <a:pPr marL="45720" indent="0">
+              <a:buNone/>
+            </a:pPr>
+            <a:r>
+              <a:rPr lang="en-US" dirty="0"/>
+              <a:t>Machine learning is an </a:t>
+            </a:r>
+            <a:r>
+              <a:rPr lang="en-US" i="1" dirty="0"/>
+              <a:t>optimization exercise</a:t>
+            </a:r>
+            <a:r>
+              <a:rPr lang="en-US" dirty="0"/>
+              <a:t>. </a:t>
+            </a:r>
+          </a:p>
+          <a:p>
+            <a:pPr marL="45720" indent="0">
+              <a:buNone/>
+            </a:pPr>
+            <a:r>
+              <a:rPr lang="en-US" dirty="0"/>
+              <a:t>Gradient descent (and its variants) is the most common optimization algorithm used in ML.</a:t>
+            </a:r>
+          </a:p>
+          <a:p>
+            <a:pPr marL="45720" indent="0">
+              <a:buNone/>
+            </a:pPr>
+            <a:r>
+              <a:rPr lang="en-US" dirty="0"/>
+              <a:t>        .. cost function, loss function, etc. Then we have regularization, etc. Minima/Maxima, etc.</a:t>
+            </a:r>
+          </a:p>
+          <a:p>
+            <a:pPr marL="45720" indent="0">
+              <a:buNone/>
+            </a:pPr>
+            <a:r>
+              <a:rPr lang="en-US" dirty="0"/>
+              <a:t>The best examples are linear regression, logistic regression, etc.</a:t>
+            </a:r>
+          </a:p>
+          <a:p>
+            <a:pPr marL="45720" indent="0">
+              <a:buNone/>
+            </a:pPr>
+            <a:endParaRPr lang="en-US" sz="900" dirty="0"/>
+          </a:p>
+          <a:p>
+            <a:pPr marL="45720" indent="0">
+              <a:buNone/>
+            </a:pPr>
+            <a:r>
+              <a:rPr lang="en-US" b="1" dirty="0"/>
+              <a:t>Fundamentally, the model tries to guess (predict) the output based on the input.</a:t>
             </a:r>
           </a:p>
         </p:txBody>
@@ -4813,7 +5584,11 @@
           <a:p>
             <a:r>
               <a:rPr lang="en-US" dirty="0"/>
-              <a:t>Recommendation</a:t>
+              <a:t>ML: </a:t>
+            </a:r>
+            <a:r>
+              <a:rPr lang="en-US" sz="2400" dirty="0"/>
+              <a:t>Non-Parametric learning</a:t>
             </a:r>
           </a:p>
         </p:txBody>
@@ -4826,6 +5601,107 @@
           </p:cNvSpPr>
           <p:nvPr>
             <p:ph idx="1"/>
+          </p:nvPr>
+        </p:nvSpPr>
+        <p:spPr>
+          <a:xfrm>
+            <a:off x="1065212" y="1828800"/>
+            <a:ext cx="9144000" cy="4191000"/>
+          </a:xfrm>
+        </p:spPr>
+        <p:txBody>
+          <a:bodyPr>
+            <a:normAutofit/>
+          </a:bodyPr>
+          <a:lstStyle/>
+          <a:p>
+            <a:pPr marL="45720" indent="0">
+              <a:buNone/>
+            </a:pPr>
+            <a:r>
+              <a:rPr lang="en-US" dirty="0"/>
+              <a:t>In a non-parametric model, there is no equation with parameters is supplied. </a:t>
+            </a:r>
+          </a:p>
+          <a:p>
+            <a:pPr marL="45720" indent="0">
+              <a:buNone/>
+            </a:pPr>
+            <a:endParaRPr lang="en-US" dirty="0"/>
+          </a:p>
+          <a:p>
+            <a:pPr marL="45720" indent="0">
+              <a:lnSpc>
+                <a:spcPct val="150000"/>
+              </a:lnSpc>
+              <a:buNone/>
+            </a:pPr>
+            <a:r>
+              <a:rPr lang="en-US" dirty="0"/>
+              <a:t>The model is learned as part of the machine learning process. The algorithm needs to determine the model based on the training data.</a:t>
+            </a:r>
+          </a:p>
+          <a:p>
+            <a:pPr marL="45720" indent="0">
+              <a:lnSpc>
+                <a:spcPct val="150000"/>
+              </a:lnSpc>
+              <a:buNone/>
+            </a:pPr>
+            <a:endParaRPr lang="en-US" dirty="0"/>
+          </a:p>
+        </p:txBody>
+      </p:sp>
+    </p:spTree>
+    <p:extLst>
+      <p:ext uri="{BB962C8B-B14F-4D97-AF65-F5344CB8AC3E}">
+        <p14:creationId xmlns:p14="http://schemas.microsoft.com/office/powerpoint/2010/main" val="2345721805"/>
+      </p:ext>
+    </p:extLst>
+  </p:cSld>
+  <p:clrMapOvr>
+    <a:masterClrMapping/>
+  </p:clrMapOvr>
+  <mc:AlternateContent xmlns:mc="http://schemas.openxmlformats.org/markup-compatibility/2006">
+    <mc:Choice xmlns:p14="http://schemas.microsoft.com/office/powerpoint/2010/main" Requires="p14">
+      <p:transition spd="med" p14:dur="700">
+        <p:fade/>
+      </p:transition>
+    </mc:Choice>
+    <mc:Fallback>
+      <p:transition spd="med">
+        <p:fade/>
+      </p:transition>
+    </mc:Fallback>
+  </mc:AlternateContent>
+</p:sld>
+</file>
+
+<file path=ppt/slides/slide8.xml><?xml version="1.0" encoding="utf-8"?>
+<p:sld xmlns:a="http://schemas.openxmlformats.org/drawingml/2006/main" xmlns:r="http://schemas.openxmlformats.org/officeDocument/2006/relationships" xmlns:p="http://schemas.openxmlformats.org/presentationml/2006/main">
+  <p:cSld>
+    <p:spTree>
+      <p:nvGrpSpPr>
+        <p:cNvPr id="1" name=""/>
+        <p:cNvGrpSpPr/>
+        <p:nvPr/>
+      </p:nvGrpSpPr>
+      <p:grpSpPr>
+        <a:xfrm>
+          <a:off x="0" y="0"/>
+          <a:ext cx="0" cy="0"/>
+          <a:chOff x="0" y="0"/>
+          <a:chExt cx="0" cy="0"/>
+        </a:xfrm>
+      </p:grpSpPr>
+      <p:sp>
+        <p:nvSpPr>
+          <p:cNvPr id="2" name="Title 1"/>
+          <p:cNvSpPr>
+            <a:spLocks noGrp="1"/>
+          </p:cNvSpPr>
+          <p:nvPr>
+            <p:ph type="title"/>
           </p:nvPr>
         </p:nvSpPr>
         <p:spPr/>
@@ -4835,25 +5711,117 @@
           <a:p>
             <a:r>
               <a:rPr lang="en-US" dirty="0"/>
-              <a:t>Recommend one or more of the strategies.</a:t>
-            </a:r>
-          </a:p>
-          <a:p>
-            <a:r>
-              <a:rPr lang="en-US" dirty="0"/>
-              <a:t>Summarize the results if things go as proposed.</a:t>
-            </a:r>
-          </a:p>
-          <a:p>
-            <a:r>
-              <a:rPr lang="en-US" dirty="0"/>
-              <a:t>What to do next.</a:t>
-            </a:r>
-          </a:p>
-          <a:p>
-            <a:r>
-              <a:rPr lang="en-US" dirty="0"/>
-              <a:t>Identify action items.</a:t>
+              <a:t>Classification of Data </a:t>
+            </a:r>
+          </a:p>
+        </p:txBody>
+      </p:sp>
+      <p:sp>
+        <p:nvSpPr>
+          <p:cNvPr id="3" name="Content Placeholder 2"/>
+          <p:cNvSpPr>
+            <a:spLocks noGrp="1"/>
+          </p:cNvSpPr>
+          <p:nvPr>
+            <p:ph idx="1"/>
+          </p:nvPr>
+        </p:nvSpPr>
+        <p:spPr>
+          <a:xfrm>
+            <a:off x="989012" y="1828800"/>
+            <a:ext cx="9829800" cy="4191000"/>
+          </a:xfrm>
+        </p:spPr>
+        <p:txBody>
+          <a:bodyPr/>
+          <a:lstStyle/>
+          <a:p>
+            <a:pPr marL="502920" indent="-457200">
+              <a:lnSpc>
+                <a:spcPct val="100000"/>
+              </a:lnSpc>
+              <a:buFont typeface="+mj-lt"/>
+              <a:buAutoNum type="arabicPeriod"/>
+            </a:pPr>
+            <a:r>
+              <a:rPr lang="en-US" dirty="0"/>
+              <a:t>Structured data:  Table, list of stock prices, monitoring data from IOT device, etc. </a:t>
+            </a:r>
+          </a:p>
+          <a:p>
+            <a:pPr marL="502920" indent="-457200">
+              <a:lnSpc>
+                <a:spcPct val="150000"/>
+              </a:lnSpc>
+              <a:buFont typeface="+mj-lt"/>
+              <a:buAutoNum type="arabicPeriod"/>
+            </a:pPr>
+            <a:r>
+              <a:rPr lang="en-US" dirty="0"/>
+              <a:t>Unstructured data:  text, audio, video, images, etc.</a:t>
+            </a:r>
+          </a:p>
+          <a:p>
+            <a:pPr marL="502920" indent="-457200">
+              <a:lnSpc>
+                <a:spcPct val="100000"/>
+              </a:lnSpc>
+              <a:buFont typeface="+mj-lt"/>
+              <a:buAutoNum type="arabicPeriod"/>
+            </a:pPr>
+            <a:r>
+              <a:rPr lang="en-US" dirty="0"/>
+              <a:t>Semi-structured data: With a structure, but the structure contains Unstructured data. example: XML, JSON, etc.</a:t>
+            </a:r>
+          </a:p>
+          <a:p>
+            <a:pPr marL="45720" indent="0">
+              <a:lnSpc>
+                <a:spcPct val="100000"/>
+              </a:lnSpc>
+              <a:buNone/>
+            </a:pPr>
+            <a:r>
+              <a:rPr lang="en-US" dirty="0"/>
+              <a:t>Or as… </a:t>
+            </a:r>
+          </a:p>
+          <a:p>
+            <a:pPr>
+              <a:lnSpc>
+                <a:spcPct val="100000"/>
+              </a:lnSpc>
+              <a:buFont typeface="Wingdings" pitchFamily="2" charset="2"/>
+              <a:buChar char="Ø"/>
+            </a:pPr>
+            <a:r>
+              <a:rPr lang="en-US" dirty="0"/>
+              <a:t>Labeled data .. data with output.</a:t>
+            </a:r>
+          </a:p>
+          <a:p>
+            <a:pPr>
+              <a:lnSpc>
+                <a:spcPct val="100000"/>
+              </a:lnSpc>
+              <a:buFont typeface="Wingdings" pitchFamily="2" charset="2"/>
+              <a:buChar char="Ø"/>
+            </a:pPr>
+            <a:r>
+              <a:rPr lang="en-US" dirty="0"/>
+              <a:t>Unlabeled data .. data without output. </a:t>
+            </a:r>
+          </a:p>
+          <a:p>
+            <a:pPr marL="365760" lvl="1" indent="0">
+              <a:lnSpc>
+                <a:spcPct val="100000"/>
+              </a:lnSpc>
+              <a:buNone/>
+            </a:pPr>
+            <a:r>
+              <a:rPr lang="en-US" dirty="0"/>
+              <a:t>   Can someone guess what these are? </a:t>
             </a:r>
           </a:p>
         </p:txBody>
@@ -4875,6 +5843,110 @@
       </p:transition>
     </mc:Choice>
     <mc:Fallback xmlns="">
+      <p:transition spd="med">
+        <p:fade/>
+      </p:transition>
+    </mc:Fallback>
+  </mc:AlternateContent>
+</p:sld>
+</file>
+
+<file path=ppt/slides/slide9.xml><?xml version="1.0" encoding="utf-8"?>
+<p:sld xmlns:a="http://schemas.openxmlformats.org/drawingml/2006/main" xmlns:r="http://schemas.openxmlformats.org/officeDocument/2006/relationships" xmlns:p="http://schemas.openxmlformats.org/presentationml/2006/main">
+  <p:cSld>
+    <p:spTree>
+      <p:nvGrpSpPr>
+        <p:cNvPr id="1" name=""/>
+        <p:cNvGrpSpPr/>
+        <p:nvPr/>
+      </p:nvGrpSpPr>
+      <p:grpSpPr>
+        <a:xfrm>
+          <a:off x="0" y="0"/>
+          <a:ext cx="0" cy="0"/>
+          <a:chOff x="0" y="0"/>
+          <a:chExt cx="0" cy="0"/>
+        </a:xfrm>
+      </p:grpSpPr>
+      <p:sp>
+        <p:nvSpPr>
+          <p:cNvPr id="2" name="Title 1"/>
+          <p:cNvSpPr>
+            <a:spLocks noGrp="1"/>
+          </p:cNvSpPr>
+          <p:nvPr>
+            <p:ph type="title"/>
+          </p:nvPr>
+        </p:nvSpPr>
+        <p:spPr/>
+        <p:txBody>
+          <a:bodyPr/>
+          <a:lstStyle/>
+          <a:p>
+            <a:r>
+              <a:rPr lang="en-US" dirty="0"/>
+              <a:t>Recommendation</a:t>
+            </a:r>
+          </a:p>
+        </p:txBody>
+      </p:sp>
+      <p:sp>
+        <p:nvSpPr>
+          <p:cNvPr id="3" name="Content Placeholder 2"/>
+          <p:cNvSpPr>
+            <a:spLocks noGrp="1"/>
+          </p:cNvSpPr>
+          <p:nvPr>
+            <p:ph idx="1"/>
+          </p:nvPr>
+        </p:nvSpPr>
+        <p:spPr/>
+        <p:txBody>
+          <a:bodyPr/>
+          <a:lstStyle/>
+          <a:p>
+            <a:r>
+              <a:rPr lang="en-US" dirty="0"/>
+              <a:t>Recommend one or more of the strategies.</a:t>
+            </a:r>
+          </a:p>
+          <a:p>
+            <a:r>
+              <a:rPr lang="en-US" dirty="0"/>
+              <a:t>Summarize the results if things go as proposed.</a:t>
+            </a:r>
+          </a:p>
+          <a:p>
+            <a:r>
+              <a:rPr lang="en-US" dirty="0"/>
+              <a:t>What to do next.</a:t>
+            </a:r>
+          </a:p>
+          <a:p>
+            <a:r>
+              <a:rPr lang="en-US" dirty="0"/>
+              <a:t>Identify action items.</a:t>
+            </a:r>
+          </a:p>
+        </p:txBody>
+      </p:sp>
+    </p:spTree>
+    <p:extLst>
+      <p:ext uri="{BB962C8B-B14F-4D97-AF65-F5344CB8AC3E}">
+        <p14:creationId xmlns:p14="http://schemas.microsoft.com/office/powerpoint/2010/main" val="3820535274"/>
+      </p:ext>
+    </p:extLst>
+  </p:cSld>
+  <p:clrMapOvr>
+    <a:masterClrMapping/>
+  </p:clrMapOvr>
+  <mc:AlternateContent xmlns:mc="http://schemas.openxmlformats.org/markup-compatibility/2006">
+    <mc:Choice xmlns:p14="http://schemas.microsoft.com/office/powerpoint/2010/main" Requires="p14">
+      <p:transition spd="med" p14:dur="700">
+        <p:fade/>
+      </p:transition>
+    </mc:Choice>
+    <mc:Fallback>
       <p:transition spd="med">
         <p:fade/>
       </p:transition>

</xml_diff>